<commit_message>
updated codes and ppt
</commit_message>
<xml_diff>
--- a/Road Features from Satellite Imagery.pptx
+++ b/Road Features from Satellite Imagery.pptx
@@ -12,10 +12,10 @@
     <p:sldId id="261" r:id="rId6"/>
     <p:sldId id="260" r:id="rId7"/>
     <p:sldId id="262" r:id="rId8"/>
-    <p:sldId id="263" r:id="rId9"/>
-    <p:sldId id="264" r:id="rId10"/>
-    <p:sldId id="265" r:id="rId11"/>
-    <p:sldId id="266" r:id="rId12"/>
+    <p:sldId id="268" r:id="rId9"/>
+    <p:sldId id="269" r:id="rId10"/>
+    <p:sldId id="263" r:id="rId11"/>
+    <p:sldId id="264" r:id="rId12"/>
     <p:sldId id="267" r:id="rId13"/>
   </p:sldIdLst>
   <p:sldSz cx="12192000" cy="6858000"/>
@@ -3658,58 +3658,153 @@
       </p:grpSpPr>
       <p:sp>
         <p:nvSpPr>
-          <p:cNvPr id="2" name="Title 1">
-            <a:extLst>
-              <a:ext uri="{FF2B5EF4-FFF2-40B4-BE49-F238E27FC236}">
-                <a16:creationId xmlns:a16="http://schemas.microsoft.com/office/drawing/2014/main" id="{02301E5F-71B8-4DE2-A1BB-5DDD12112A45}"/>
-              </a:ext>
-            </a:extLst>
-          </p:cNvPr>
-          <p:cNvSpPr>
-            <a:spLocks noGrp="1"/>
-          </p:cNvSpPr>
-          <p:nvPr>
-            <p:ph type="title"/>
-          </p:nvPr>
-        </p:nvSpPr>
-        <p:spPr/>
-        <p:txBody>
-          <a:bodyPr/>
+          <p:cNvPr id="3" name="Content Placeholder 2">
+            <a:extLst>
+              <a:ext uri="{FF2B5EF4-FFF2-40B4-BE49-F238E27FC236}">
+                <a16:creationId xmlns:a16="http://schemas.microsoft.com/office/drawing/2014/main" id="{7E53713B-7824-4972-93F9-2079B97EC683}"/>
+              </a:ext>
+            </a:extLst>
+          </p:cNvPr>
+          <p:cNvSpPr>
+            <a:spLocks noGrp="1"/>
+          </p:cNvSpPr>
+          <p:nvPr>
+            <p:ph idx="1"/>
+          </p:nvPr>
+        </p:nvSpPr>
+        <p:spPr>
+          <a:xfrm>
+            <a:off x="838200" y="1209675"/>
+            <a:ext cx="10515600" cy="4967288"/>
+          </a:xfrm>
+        </p:spPr>
+        <p:txBody>
+          <a:bodyPr>
+            <a:normAutofit/>
+          </a:bodyPr>
           <a:lstStyle/>
           <a:p>
-            <a:endParaRPr lang="en-US"/>
-          </a:p>
-        </p:txBody>
-      </p:sp>
-      <p:sp>
-        <p:nvSpPr>
-          <p:cNvPr id="3" name="Content Placeholder 2">
-            <a:extLst>
-              <a:ext uri="{FF2B5EF4-FFF2-40B4-BE49-F238E27FC236}">
-                <a16:creationId xmlns:a16="http://schemas.microsoft.com/office/drawing/2014/main" id="{7E53713B-7824-4972-93F9-2079B97EC683}"/>
-              </a:ext>
-            </a:extLst>
-          </p:cNvPr>
-          <p:cNvSpPr>
-            <a:spLocks noGrp="1"/>
-          </p:cNvSpPr>
-          <p:nvPr>
-            <p:ph idx="1"/>
-          </p:nvPr>
-        </p:nvSpPr>
-        <p:spPr/>
-        <p:txBody>
-          <a:bodyPr/>
-          <a:lstStyle/>
-          <a:p>
-            <a:endParaRPr lang="en-US"/>
+            <a:r>
+              <a:rPr lang="en-US" sz="2000" dirty="0"/>
+              <a:t>Not having a dedicated GPU env, I used Google </a:t>
+            </a:r>
+            <a:r>
+              <a:rPr lang="en-US" sz="2000" dirty="0" err="1"/>
+              <a:t>Colab</a:t>
+            </a:r>
+            <a:r>
+              <a:rPr lang="en-US" sz="2000" dirty="0"/>
+              <a:t>, but faced a lot of challenges</a:t>
+            </a:r>
+          </a:p>
+          <a:p>
+            <a:pPr lvl="1"/>
+            <a:r>
+              <a:rPr lang="en-US" sz="1600" dirty="0"/>
+              <a:t>Data  copied from local to Google drive – it took around 8 hours to upload 21K images &amp; 21K masks  </a:t>
+            </a:r>
+          </a:p>
+          <a:p>
+            <a:pPr lvl="1"/>
+            <a:r>
+              <a:rPr lang="en-US" sz="1600" dirty="0"/>
+              <a:t>Model training was very slow – GPU not available constant, Runtime disconnects on inactivity.</a:t>
+            </a:r>
+          </a:p>
+          <a:p>
+            <a:pPr lvl="1"/>
+            <a:r>
+              <a:rPr lang="en-US" sz="1600" dirty="0"/>
+              <a:t>Notebook crashed due to insufficient RAM. </a:t>
+            </a:r>
+          </a:p>
+          <a:p>
+            <a:r>
+              <a:rPr lang="en-US" sz="2000" dirty="0"/>
+              <a:t>Copying images to Google drive created duplicates that wasted lot of time</a:t>
+            </a:r>
+          </a:p>
+          <a:p>
+            <a:r>
+              <a:rPr lang="en-US" sz="2000" dirty="0"/>
+              <a:t>It was an experiment to crop (250, 250) and resize to (256, 256). But it many preprocessing tasks. So, I might have planned accordingly and cropped (256, 256) to save time.</a:t>
+            </a:r>
+          </a:p>
+          <a:p>
+            <a:r>
+              <a:rPr lang="en-US" sz="2000" dirty="0"/>
+              <a:t>Stitching back test images to create original test images and their predicted masks was a time consuming but good learning experience.</a:t>
+            </a:r>
+          </a:p>
+          <a:p>
+            <a:r>
+              <a:rPr lang="en-US" sz="2000" dirty="0"/>
+              <a:t>I tried to implement different model architecture, but data processing could not be completed in couple of hours, so had to drop the idea. </a:t>
+            </a:r>
+          </a:p>
+          <a:p>
+            <a:endParaRPr lang="en-US" sz="2000" dirty="0"/>
+          </a:p>
+        </p:txBody>
+      </p:sp>
+      <p:sp>
+        <p:nvSpPr>
+          <p:cNvPr id="4" name="Title 1">
+            <a:extLst>
+              <a:ext uri="{FF2B5EF4-FFF2-40B4-BE49-F238E27FC236}">
+                <a16:creationId xmlns:a16="http://schemas.microsoft.com/office/drawing/2014/main" id="{4F7F33C7-21A7-43CD-AB96-9CF0CD29B5EC}"/>
+              </a:ext>
+            </a:extLst>
+          </p:cNvPr>
+          <p:cNvSpPr txBox="1">
+            <a:spLocks/>
+          </p:cNvSpPr>
+          <p:nvPr/>
+        </p:nvSpPr>
+        <p:spPr>
+          <a:xfrm>
+            <a:off x="838200" y="0"/>
+            <a:ext cx="10515600" cy="828675"/>
+          </a:xfrm>
+          <a:prstGeom prst="rect">
+            <a:avLst/>
+          </a:prstGeom>
+        </p:spPr>
+        <p:txBody>
+          <a:bodyPr vert="horz" lIns="91440" tIns="45720" rIns="91440" bIns="45720" rtlCol="0" anchor="ctr">
+            <a:normAutofit/>
+          </a:bodyPr>
+          <a:lstStyle>
+            <a:lvl1pPr algn="l" defTabSz="914400" rtl="0" eaLnBrk="1" latinLnBrk="0" hangingPunct="1">
+              <a:lnSpc>
+                <a:spcPct val="90000"/>
+              </a:lnSpc>
+              <a:spcBef>
+                <a:spcPct val="0"/>
+              </a:spcBef>
+              <a:buNone/>
+              <a:defRPr sz="4400" kern="1200">
+                <a:solidFill>
+                  <a:schemeClr val="tx1"/>
+                </a:solidFill>
+                <a:latin typeface="+mj-lt"/>
+                <a:ea typeface="+mj-ea"/>
+                <a:cs typeface="+mj-cs"/>
+              </a:defRPr>
+            </a:lvl1pPr>
+          </a:lstStyle>
+          <a:p>
+            <a:r>
+              <a:rPr lang="en-US" b="1" dirty="0"/>
+              <a:t>Challenges And Learnings: </a:t>
+            </a:r>
           </a:p>
         </p:txBody>
       </p:sp>
     </p:spTree>
     <p:extLst>
       <p:ext uri="{BB962C8B-B14F-4D97-AF65-F5344CB8AC3E}">
-        <p14:creationId xmlns:p14="http://schemas.microsoft.com/office/powerpoint/2010/main" val="3441778347"/>
+        <p14:creationId xmlns:p14="http://schemas.microsoft.com/office/powerpoint/2010/main" val="2717896810"/>
       </p:ext>
     </p:extLst>
   </p:cSld>
@@ -3738,58 +3833,127 @@
       </p:grpSpPr>
       <p:sp>
         <p:nvSpPr>
-          <p:cNvPr id="2" name="Title 1">
-            <a:extLst>
-              <a:ext uri="{FF2B5EF4-FFF2-40B4-BE49-F238E27FC236}">
-                <a16:creationId xmlns:a16="http://schemas.microsoft.com/office/drawing/2014/main" id="{02301E5F-71B8-4DE2-A1BB-5DDD12112A45}"/>
-              </a:ext>
-            </a:extLst>
-          </p:cNvPr>
-          <p:cNvSpPr>
-            <a:spLocks noGrp="1"/>
-          </p:cNvSpPr>
-          <p:nvPr>
-            <p:ph type="title"/>
-          </p:nvPr>
-        </p:nvSpPr>
-        <p:spPr/>
-        <p:txBody>
-          <a:bodyPr/>
+          <p:cNvPr id="3" name="Content Placeholder 2">
+            <a:extLst>
+              <a:ext uri="{FF2B5EF4-FFF2-40B4-BE49-F238E27FC236}">
+                <a16:creationId xmlns:a16="http://schemas.microsoft.com/office/drawing/2014/main" id="{7E53713B-7824-4972-93F9-2079B97EC683}"/>
+              </a:ext>
+            </a:extLst>
+          </p:cNvPr>
+          <p:cNvSpPr>
+            <a:spLocks noGrp="1"/>
+          </p:cNvSpPr>
+          <p:nvPr>
+            <p:ph idx="1"/>
+          </p:nvPr>
+        </p:nvSpPr>
+        <p:spPr>
+          <a:xfrm>
+            <a:off x="838200" y="1400175"/>
+            <a:ext cx="10515600" cy="4776788"/>
+          </a:xfrm>
+        </p:spPr>
+        <p:txBody>
+          <a:bodyPr>
+            <a:normAutofit/>
+          </a:bodyPr>
           <a:lstStyle/>
           <a:p>
-            <a:endParaRPr lang="en-US"/>
-          </a:p>
-        </p:txBody>
-      </p:sp>
-      <p:sp>
-        <p:nvSpPr>
-          <p:cNvPr id="3" name="Content Placeholder 2">
-            <a:extLst>
-              <a:ext uri="{FF2B5EF4-FFF2-40B4-BE49-F238E27FC236}">
-                <a16:creationId xmlns:a16="http://schemas.microsoft.com/office/drawing/2014/main" id="{7E53713B-7824-4972-93F9-2079B97EC683}"/>
-              </a:ext>
-            </a:extLst>
-          </p:cNvPr>
-          <p:cNvSpPr>
-            <a:spLocks noGrp="1"/>
-          </p:cNvSpPr>
-          <p:nvPr>
-            <p:ph idx="1"/>
-          </p:nvPr>
-        </p:nvSpPr>
-        <p:spPr/>
-        <p:txBody>
-          <a:bodyPr/>
-          <a:lstStyle/>
-          <a:p>
-            <a:endParaRPr lang="en-US"/>
+            <a:r>
+              <a:rPr lang="en-US" sz="2000" dirty="0"/>
+              <a:t>On a dedicated GPU system experiments could be faster and more hyperparameters tuning. </a:t>
+            </a:r>
+          </a:p>
+          <a:p>
+            <a:r>
+              <a:rPr lang="en-US" sz="2000" dirty="0"/>
+              <a:t>Data augmentation could have been tried.</a:t>
+            </a:r>
+          </a:p>
+          <a:p>
+            <a:r>
+              <a:rPr lang="en-US" sz="2000" dirty="0"/>
+              <a:t>Tuning the model with different optimizers, loss functions could be done.</a:t>
+            </a:r>
+          </a:p>
+          <a:p>
+            <a:r>
+              <a:rPr lang="en-US" sz="2000" dirty="0"/>
+              <a:t>Maybe cropping with (256, 256) could have better result, but (250, 250) crop was an experiment.</a:t>
+            </a:r>
+          </a:p>
+          <a:p>
+            <a:r>
+              <a:rPr lang="en-US" sz="2000" dirty="0"/>
+              <a:t>Another thought behind (250, 250) crop was that it was easy to stitch the crops together to form the original test images / predictions.</a:t>
+            </a:r>
+          </a:p>
+          <a:p>
+            <a:r>
+              <a:rPr lang="en-US" sz="2000" dirty="0"/>
+              <a:t>Experimented with </a:t>
+            </a:r>
+          </a:p>
+        </p:txBody>
+      </p:sp>
+      <p:sp>
+        <p:nvSpPr>
+          <p:cNvPr id="4" name="Title 1">
+            <a:extLst>
+              <a:ext uri="{FF2B5EF4-FFF2-40B4-BE49-F238E27FC236}">
+                <a16:creationId xmlns:a16="http://schemas.microsoft.com/office/drawing/2014/main" id="{3AB10D64-A0C6-4340-9F7E-6B56E27E71C0}"/>
+              </a:ext>
+            </a:extLst>
+          </p:cNvPr>
+          <p:cNvSpPr txBox="1">
+            <a:spLocks/>
+          </p:cNvSpPr>
+          <p:nvPr/>
+        </p:nvSpPr>
+        <p:spPr>
+          <a:xfrm>
+            <a:off x="838200" y="0"/>
+            <a:ext cx="10515600" cy="828675"/>
+          </a:xfrm>
+          <a:prstGeom prst="rect">
+            <a:avLst/>
+          </a:prstGeom>
+        </p:spPr>
+        <p:txBody>
+          <a:bodyPr vert="horz" lIns="91440" tIns="45720" rIns="91440" bIns="45720" rtlCol="0" anchor="ctr">
+            <a:normAutofit/>
+          </a:bodyPr>
+          <a:lstStyle>
+            <a:lvl1pPr algn="l" defTabSz="914400" rtl="0" eaLnBrk="1" latinLnBrk="0" hangingPunct="1">
+              <a:lnSpc>
+                <a:spcPct val="90000"/>
+              </a:lnSpc>
+              <a:spcBef>
+                <a:spcPct val="0"/>
+              </a:spcBef>
+              <a:buNone/>
+              <a:defRPr sz="4400" kern="1200">
+                <a:solidFill>
+                  <a:schemeClr val="tx1"/>
+                </a:solidFill>
+                <a:latin typeface="+mj-lt"/>
+                <a:ea typeface="+mj-ea"/>
+                <a:cs typeface="+mj-cs"/>
+              </a:defRPr>
+            </a:lvl1pPr>
+          </a:lstStyle>
+          <a:p>
+            <a:r>
+              <a:rPr lang="en-US" b="1" dirty="0"/>
+              <a:t>Scope For Improvement </a:t>
+            </a:r>
           </a:p>
         </p:txBody>
       </p:sp>
     </p:spTree>
     <p:extLst>
       <p:ext uri="{BB962C8B-B14F-4D97-AF65-F5344CB8AC3E}">
-        <p14:creationId xmlns:p14="http://schemas.microsoft.com/office/powerpoint/2010/main" val="540744244"/>
+        <p14:creationId xmlns:p14="http://schemas.microsoft.com/office/powerpoint/2010/main" val="114371724"/>
       </p:ext>
     </p:extLst>
   </p:cSld>
@@ -5437,51 +5601,257 @@
       </p:grpSpPr>
       <p:sp>
         <p:nvSpPr>
-          <p:cNvPr id="2" name="Title 1">
-            <a:extLst>
-              <a:ext uri="{FF2B5EF4-FFF2-40B4-BE49-F238E27FC236}">
-                <a16:creationId xmlns:a16="http://schemas.microsoft.com/office/drawing/2014/main" id="{02301E5F-71B8-4DE2-A1BB-5DDD12112A45}"/>
-              </a:ext>
-            </a:extLst>
-          </p:cNvPr>
-          <p:cNvSpPr>
-            <a:spLocks noGrp="1"/>
-          </p:cNvSpPr>
-          <p:nvPr>
-            <p:ph type="title"/>
-          </p:nvPr>
-        </p:nvSpPr>
-        <p:spPr/>
-        <p:txBody>
-          <a:bodyPr/>
+          <p:cNvPr id="3" name="Content Placeholder 2">
+            <a:extLst>
+              <a:ext uri="{FF2B5EF4-FFF2-40B4-BE49-F238E27FC236}">
+                <a16:creationId xmlns:a16="http://schemas.microsoft.com/office/drawing/2014/main" id="{7E53713B-7824-4972-93F9-2079B97EC683}"/>
+              </a:ext>
+            </a:extLst>
+          </p:cNvPr>
+          <p:cNvSpPr>
+            <a:spLocks noGrp="1"/>
+          </p:cNvSpPr>
+          <p:nvPr>
+            <p:ph idx="1"/>
+          </p:nvPr>
+        </p:nvSpPr>
+        <p:spPr>
+          <a:xfrm>
+            <a:off x="838200" y="1123950"/>
+            <a:ext cx="10515600" cy="5267325"/>
+          </a:xfrm>
+        </p:spPr>
+        <p:txBody>
+          <a:bodyPr>
+            <a:normAutofit/>
+          </a:bodyPr>
           <a:lstStyle/>
           <a:p>
-            <a:endParaRPr lang="en-US"/>
-          </a:p>
-        </p:txBody>
-      </p:sp>
-      <p:sp>
-        <p:nvSpPr>
-          <p:cNvPr id="3" name="Content Placeholder 2">
-            <a:extLst>
-              <a:ext uri="{FF2B5EF4-FFF2-40B4-BE49-F238E27FC236}">
-                <a16:creationId xmlns:a16="http://schemas.microsoft.com/office/drawing/2014/main" id="{7E53713B-7824-4972-93F9-2079B97EC683}"/>
-              </a:ext>
-            </a:extLst>
-          </p:cNvPr>
-          <p:cNvSpPr>
-            <a:spLocks noGrp="1"/>
-          </p:cNvSpPr>
-          <p:nvPr>
-            <p:ph idx="1"/>
-          </p:nvPr>
-        </p:nvSpPr>
-        <p:spPr/>
-        <p:txBody>
-          <a:bodyPr/>
-          <a:lstStyle/>
-          <a:p>
-            <a:endParaRPr lang="en-US"/>
+            <a:r>
+              <a:rPr lang="en-US" sz="1800" dirty="0"/>
+              <a:t>Google drive mounted on Google </a:t>
+            </a:r>
+            <a:r>
+              <a:rPr lang="en-US" sz="1800" dirty="0" err="1"/>
+              <a:t>Colab</a:t>
+            </a:r>
+            <a:r>
+              <a:rPr lang="en-US" sz="1800" dirty="0"/>
+              <a:t> notebook</a:t>
+            </a:r>
+          </a:p>
+          <a:p>
+            <a:r>
+              <a:rPr lang="en-US" sz="1800" dirty="0"/>
+              <a:t>Copying images and masks to Google drive had many duplicate images and masks.</a:t>
+            </a:r>
+          </a:p>
+          <a:p>
+            <a:r>
+              <a:rPr lang="en-US" sz="1800" dirty="0"/>
+              <a:t>All these duplicates are found and removed from respective folders.</a:t>
+            </a:r>
+          </a:p>
+          <a:p>
+            <a:r>
+              <a:rPr lang="en-US" sz="1800" dirty="0"/>
+              <a:t>All images and masks resized to (256, 256) before model training.</a:t>
+            </a:r>
+          </a:p>
+          <a:p>
+            <a:r>
+              <a:rPr lang="en-US" sz="1800" dirty="0"/>
+              <a:t>Training and Validation data generated using </a:t>
+            </a:r>
+            <a:r>
+              <a:rPr lang="en-US" sz="1800" b="1" dirty="0"/>
+              <a:t>data_generator </a:t>
+            </a:r>
+            <a:r>
+              <a:rPr lang="en-US" sz="1800" dirty="0"/>
+              <a:t>class – it returns a generator of zipped images and their masks as per the </a:t>
+            </a:r>
+            <a:r>
+              <a:rPr lang="en-US" sz="1800" b="1" dirty="0" err="1"/>
+              <a:t>batch_size</a:t>
+            </a:r>
+            <a:r>
+              <a:rPr lang="en-US" sz="1800" b="1" dirty="0"/>
+              <a:t> </a:t>
+            </a:r>
+            <a:r>
+              <a:rPr lang="en-US" sz="1800" dirty="0"/>
+              <a:t>supplied to the class </a:t>
+            </a:r>
+            <a:r>
+              <a:rPr lang="en-US" sz="1800" i="1" dirty="0"/>
+              <a:t>(ref: Keras documentation)</a:t>
+            </a:r>
+          </a:p>
+          <a:p>
+            <a:r>
+              <a:rPr lang="en-US" sz="1800" dirty="0"/>
+              <a:t>Train and Val datasets verified for correct size of the array </a:t>
+            </a:r>
+          </a:p>
+          <a:p>
+            <a:pPr marL="0" indent="0">
+              <a:buNone/>
+            </a:pPr>
+            <a:r>
+              <a:rPr lang="fr-FR" sz="1800" dirty="0"/>
+              <a:t>	Train image:  (16, 256, 256, 3)	 Train mask:  (16, 256, 256, 1)</a:t>
+            </a:r>
+          </a:p>
+          <a:p>
+            <a:pPr marL="0" indent="0">
+              <a:buNone/>
+            </a:pPr>
+            <a:r>
+              <a:rPr lang="fr-FR" sz="1800" dirty="0"/>
+              <a:t>	Val image:  (16, 256, 256, 3)		 Val mask:  (16, 256, 256, 1)</a:t>
+            </a:r>
+          </a:p>
+          <a:p>
+            <a:r>
+              <a:rPr lang="en-US" sz="1800" dirty="0"/>
+              <a:t>Also verified that masks should have only normalized 1 and 0 representing white and black pixels</a:t>
+            </a:r>
+          </a:p>
+          <a:p>
+            <a:r>
+              <a:rPr lang="en-US" sz="1800" dirty="0"/>
+              <a:t>U-Net model is defined </a:t>
+            </a:r>
+            <a:r>
+              <a:rPr lang="en-US" sz="1800" i="1" dirty="0"/>
+              <a:t>(ref: Keras documentation) </a:t>
+            </a:r>
+          </a:p>
+          <a:p>
+            <a:r>
+              <a:rPr lang="en-US" sz="1800" dirty="0"/>
+              <a:t>I changed metrics to </a:t>
+            </a:r>
+            <a:r>
+              <a:rPr lang="en-US" sz="1800" dirty="0" err="1"/>
+              <a:t>IoU</a:t>
+            </a:r>
+            <a:r>
+              <a:rPr lang="en-US" sz="1800" dirty="0"/>
+              <a:t> while compiling model because </a:t>
+            </a:r>
+            <a:r>
+              <a:rPr lang="en-US" sz="1800" dirty="0" err="1"/>
+              <a:t>IoU</a:t>
+            </a:r>
+            <a:r>
+              <a:rPr lang="en-US" sz="1800" dirty="0"/>
+              <a:t> is important for us.</a:t>
+            </a:r>
+          </a:p>
+          <a:p>
+            <a:r>
+              <a:rPr lang="en-US" sz="1800" dirty="0"/>
+              <a:t>Model wasn’t converging well because </a:t>
+            </a:r>
+            <a:r>
+              <a:rPr lang="en-US" sz="1800" b="1" dirty="0" err="1"/>
+              <a:t>val_loss</a:t>
+            </a:r>
+            <a:r>
+              <a:rPr lang="en-US" sz="1800" dirty="0"/>
+              <a:t> wasn’t decreasing while </a:t>
+            </a:r>
+            <a:r>
+              <a:rPr lang="en-US" sz="1800" dirty="0" err="1"/>
+              <a:t>IoU</a:t>
+            </a:r>
+            <a:r>
+              <a:rPr lang="en-US" sz="1800" dirty="0"/>
+              <a:t> was increasing. A better strategy could be monitor </a:t>
+            </a:r>
+            <a:r>
+              <a:rPr lang="en-US" sz="1800" dirty="0" err="1"/>
+              <a:t>IoU</a:t>
+            </a:r>
+            <a:r>
+              <a:rPr lang="en-US" sz="1800" dirty="0"/>
+              <a:t> in </a:t>
+            </a:r>
+            <a:r>
+              <a:rPr lang="en-US" sz="1800" b="1" dirty="0" err="1"/>
+              <a:t>ModelCheckpoint</a:t>
+            </a:r>
+            <a:r>
+              <a:rPr lang="en-US" sz="1800" dirty="0"/>
+              <a:t> instead of </a:t>
+            </a:r>
+            <a:r>
+              <a:rPr lang="en-US" sz="1800" dirty="0" err="1"/>
+              <a:t>val_loss</a:t>
+            </a:r>
+            <a:r>
+              <a:rPr lang="en-US" sz="1800" dirty="0"/>
+              <a:t>.</a:t>
+            </a:r>
+          </a:p>
+          <a:p>
+            <a:endParaRPr lang="en-US" sz="1800" dirty="0"/>
+          </a:p>
+        </p:txBody>
+      </p:sp>
+      <p:sp>
+        <p:nvSpPr>
+          <p:cNvPr id="4" name="Title 1">
+            <a:extLst>
+              <a:ext uri="{FF2B5EF4-FFF2-40B4-BE49-F238E27FC236}">
+                <a16:creationId xmlns:a16="http://schemas.microsoft.com/office/drawing/2014/main" id="{682DCFFD-3425-4452-9980-AF9C9644B6B1}"/>
+              </a:ext>
+            </a:extLst>
+          </p:cNvPr>
+          <p:cNvSpPr txBox="1">
+            <a:spLocks/>
+          </p:cNvSpPr>
+          <p:nvPr/>
+        </p:nvSpPr>
+        <p:spPr>
+          <a:xfrm>
+            <a:off x="838200" y="0"/>
+            <a:ext cx="10515600" cy="828675"/>
+          </a:xfrm>
+          <a:prstGeom prst="rect">
+            <a:avLst/>
+          </a:prstGeom>
+        </p:spPr>
+        <p:txBody>
+          <a:bodyPr vert="horz" lIns="91440" tIns="45720" rIns="91440" bIns="45720" rtlCol="0" anchor="ctr">
+            <a:normAutofit/>
+          </a:bodyPr>
+          <a:lstStyle>
+            <a:lvl1pPr algn="l" defTabSz="914400" rtl="0" eaLnBrk="1" latinLnBrk="0" hangingPunct="1">
+              <a:lnSpc>
+                <a:spcPct val="90000"/>
+              </a:lnSpc>
+              <a:spcBef>
+                <a:spcPct val="0"/>
+              </a:spcBef>
+              <a:buNone/>
+              <a:defRPr sz="4400" kern="1200">
+                <a:solidFill>
+                  <a:schemeClr val="tx1"/>
+                </a:solidFill>
+                <a:latin typeface="+mj-lt"/>
+                <a:ea typeface="+mj-ea"/>
+                <a:cs typeface="+mj-cs"/>
+              </a:defRPr>
+            </a:lvl1pPr>
+          </a:lstStyle>
+          <a:p>
+            <a:r>
+              <a:rPr lang="en-US" b="1" dirty="0"/>
+              <a:t>Data Preparation – Model Training</a:t>
+            </a:r>
           </a:p>
         </p:txBody>
       </p:sp>
@@ -5517,117 +5887,10 @@
       </p:grpSpPr>
       <p:sp>
         <p:nvSpPr>
-          <p:cNvPr id="3" name="Content Placeholder 2">
-            <a:extLst>
-              <a:ext uri="{FF2B5EF4-FFF2-40B4-BE49-F238E27FC236}">
-                <a16:creationId xmlns:a16="http://schemas.microsoft.com/office/drawing/2014/main" id="{7E53713B-7824-4972-93F9-2079B97EC683}"/>
-              </a:ext>
-            </a:extLst>
-          </p:cNvPr>
-          <p:cNvSpPr>
-            <a:spLocks noGrp="1"/>
-          </p:cNvSpPr>
-          <p:nvPr>
-            <p:ph idx="1"/>
-          </p:nvPr>
-        </p:nvSpPr>
-        <p:spPr>
-          <a:xfrm>
-            <a:off x="838200" y="1209675"/>
-            <a:ext cx="10515600" cy="4967288"/>
-          </a:xfrm>
-        </p:spPr>
-        <p:txBody>
-          <a:bodyPr>
-            <a:normAutofit/>
-          </a:bodyPr>
-          <a:lstStyle/>
-          <a:p>
-            <a:r>
-              <a:rPr lang="en-US" sz="2000" dirty="0"/>
-              <a:t>Not having any dedicated GPU env, I used Google </a:t>
-            </a:r>
-            <a:r>
-              <a:rPr lang="en-US" sz="2000" dirty="0" err="1"/>
-              <a:t>Colab</a:t>
-            </a:r>
-            <a:r>
-              <a:rPr lang="en-US" sz="2000" dirty="0"/>
-              <a:t>, but faced a lot of challenges</a:t>
-            </a:r>
-          </a:p>
-          <a:p>
-            <a:pPr lvl="1"/>
-            <a:r>
-              <a:rPr lang="en-US" sz="1600" dirty="0"/>
-              <a:t>Data  copied from local to Google drive – it took around 8 hours to upload 21K images &amp; 21K masks  </a:t>
-            </a:r>
-          </a:p>
-          <a:p>
-            <a:pPr lvl="1"/>
-            <a:r>
-              <a:rPr lang="en-US" sz="1600" dirty="0"/>
-              <a:t>Model training was very slow – GPU not available constant, intermittent connect-disconnect.</a:t>
-            </a:r>
-          </a:p>
-          <a:p>
-            <a:pPr lvl="1"/>
-            <a:r>
-              <a:rPr lang="en-US" sz="1600" dirty="0"/>
-              <a:t>Notebook crashed due to insufficient RAM. </a:t>
-            </a:r>
-          </a:p>
-          <a:p>
-            <a:r>
-              <a:rPr lang="en-US" sz="2000" dirty="0"/>
-              <a:t>Copying images to Google drive created duplicates that wasted lot of time</a:t>
-            </a:r>
-          </a:p>
-          <a:p>
-            <a:r>
-              <a:rPr lang="en-US" sz="2000" dirty="0"/>
-              <a:t>It was an experiment to crop (250, 250) and resize to (256, 256). But it many preprocessing tasks. So, I might have planned accordingly and cropped (256, 256) to save time.</a:t>
-            </a:r>
-          </a:p>
-          <a:p>
-            <a:r>
-              <a:rPr lang="en-US" sz="2000" dirty="0"/>
-              <a:t>Stitching back test images to create original test images and their predicted masks was a time consuming but good learning experience.</a:t>
-            </a:r>
-          </a:p>
-          <a:p>
-            <a:r>
-              <a:rPr lang="en-US" sz="2000" dirty="0"/>
-              <a:t>I tried to implement different </a:t>
-            </a:r>
-            <a:r>
-              <a:rPr lang="en-US" sz="2000"/>
-              <a:t>model architecture, </a:t>
-            </a:r>
-            <a:r>
-              <a:rPr lang="en-US" sz="2000" dirty="0"/>
-              <a:t>but data processing could not be completed in couple of hours, so had to </a:t>
-            </a:r>
-            <a:r>
-              <a:rPr lang="en-US" sz="2000"/>
-              <a:t>drop the </a:t>
-            </a:r>
-            <a:r>
-              <a:rPr lang="en-US" sz="2000" dirty="0"/>
-              <a:t>idea. </a:t>
-            </a:r>
-          </a:p>
-          <a:p>
-            <a:endParaRPr lang="en-US" sz="2000" dirty="0"/>
-          </a:p>
-        </p:txBody>
-      </p:sp>
-      <p:sp>
-        <p:nvSpPr>
           <p:cNvPr id="4" name="Title 1">
             <a:extLst>
               <a:ext uri="{FF2B5EF4-FFF2-40B4-BE49-F238E27FC236}">
-                <a16:creationId xmlns:a16="http://schemas.microsoft.com/office/drawing/2014/main" id="{4F7F33C7-21A7-43CD-AB96-9CF0CD29B5EC}"/>
+                <a16:creationId xmlns:a16="http://schemas.microsoft.com/office/drawing/2014/main" id="{682DCFFD-3425-4452-9980-AF9C9644B6B1}"/>
               </a:ext>
             </a:extLst>
           </p:cNvPr>
@@ -5671,15 +5934,47 @@
           <a:p>
             <a:r>
               <a:rPr lang="en-US" b="1" dirty="0"/>
-              <a:t>Challenges And Learnings: </a:t>
-            </a:r>
+              <a:t>Model Training - Prediction</a:t>
+            </a:r>
+          </a:p>
+        </p:txBody>
+      </p:sp>
+      <p:sp>
+        <p:nvSpPr>
+          <p:cNvPr id="5" name="Content Placeholder 4">
+            <a:extLst>
+              <a:ext uri="{FF2B5EF4-FFF2-40B4-BE49-F238E27FC236}">
+                <a16:creationId xmlns:a16="http://schemas.microsoft.com/office/drawing/2014/main" id="{F7B6E0BB-C9BF-433D-9845-610156973886}"/>
+              </a:ext>
+            </a:extLst>
+          </p:cNvPr>
+          <p:cNvSpPr>
+            <a:spLocks noGrp="1"/>
+          </p:cNvSpPr>
+          <p:nvPr>
+            <p:ph idx="1"/>
+          </p:nvPr>
+        </p:nvSpPr>
+        <p:spPr>
+          <a:xfrm>
+            <a:off x="838200" y="1047750"/>
+            <a:ext cx="10515600" cy="5129213"/>
+          </a:xfrm>
+        </p:spPr>
+        <p:txBody>
+          <a:bodyPr>
+            <a:normAutofit/>
+          </a:bodyPr>
+          <a:lstStyle/>
+          <a:p>
+            <a:endParaRPr lang="en-US" sz="1800" dirty="0"/>
           </a:p>
         </p:txBody>
       </p:sp>
     </p:spTree>
     <p:extLst>
       <p:ext uri="{BB962C8B-B14F-4D97-AF65-F5344CB8AC3E}">
-        <p14:creationId xmlns:p14="http://schemas.microsoft.com/office/powerpoint/2010/main" val="2717896810"/>
+        <p14:creationId xmlns:p14="http://schemas.microsoft.com/office/powerpoint/2010/main" val="255071821"/>
       </p:ext>
     </p:extLst>
   </p:cSld>
@@ -5708,57 +6003,10 @@
       </p:grpSpPr>
       <p:sp>
         <p:nvSpPr>
-          <p:cNvPr id="3" name="Content Placeholder 2">
-            <a:extLst>
-              <a:ext uri="{FF2B5EF4-FFF2-40B4-BE49-F238E27FC236}">
-                <a16:creationId xmlns:a16="http://schemas.microsoft.com/office/drawing/2014/main" id="{7E53713B-7824-4972-93F9-2079B97EC683}"/>
-              </a:ext>
-            </a:extLst>
-          </p:cNvPr>
-          <p:cNvSpPr>
-            <a:spLocks noGrp="1"/>
-          </p:cNvSpPr>
-          <p:nvPr>
-            <p:ph idx="1"/>
-          </p:nvPr>
-        </p:nvSpPr>
-        <p:spPr>
-          <a:xfrm>
-            <a:off x="838200" y="1400175"/>
-            <a:ext cx="10515600" cy="4776788"/>
-          </a:xfrm>
-        </p:spPr>
-        <p:txBody>
-          <a:bodyPr>
-            <a:normAutofit/>
-          </a:bodyPr>
-          <a:lstStyle/>
-          <a:p>
-            <a:r>
-              <a:rPr lang="en-US" sz="2000" dirty="0"/>
-              <a:t>On a dedicated GPU system experiments could be much smoother and thus better results.</a:t>
-            </a:r>
-          </a:p>
-          <a:p>
-            <a:r>
-              <a:rPr lang="en-US" sz="2000" dirty="0"/>
-              <a:t>Data augmentation could have been tried.</a:t>
-            </a:r>
-          </a:p>
-          <a:p>
-            <a:r>
-              <a:rPr lang="en-US" sz="2000" dirty="0"/>
-              <a:t>Tuning the model with different optimizers, loss functions could be done.</a:t>
-            </a:r>
-          </a:p>
-        </p:txBody>
-      </p:sp>
-      <p:sp>
-        <p:nvSpPr>
           <p:cNvPr id="4" name="Title 1">
             <a:extLst>
               <a:ext uri="{FF2B5EF4-FFF2-40B4-BE49-F238E27FC236}">
-                <a16:creationId xmlns:a16="http://schemas.microsoft.com/office/drawing/2014/main" id="{3AB10D64-A0C6-4340-9F7E-6B56E27E71C0}"/>
+                <a16:creationId xmlns:a16="http://schemas.microsoft.com/office/drawing/2014/main" id="{682DCFFD-3425-4452-9980-AF9C9644B6B1}"/>
               </a:ext>
             </a:extLst>
           </p:cNvPr>
@@ -5802,15 +6050,139 @@
           <a:p>
             <a:r>
               <a:rPr lang="en-US" b="1" dirty="0"/>
-              <a:t>Scope For Improvement </a:t>
-            </a:r>
+              <a:t>Result on Test Data</a:t>
+            </a:r>
+          </a:p>
+        </p:txBody>
+      </p:sp>
+      <p:sp>
+        <p:nvSpPr>
+          <p:cNvPr id="5" name="Content Placeholder 4">
+            <a:extLst>
+              <a:ext uri="{FF2B5EF4-FFF2-40B4-BE49-F238E27FC236}">
+                <a16:creationId xmlns:a16="http://schemas.microsoft.com/office/drawing/2014/main" id="{F7B6E0BB-C9BF-433D-9845-610156973886}"/>
+              </a:ext>
+            </a:extLst>
+          </p:cNvPr>
+          <p:cNvSpPr>
+            <a:spLocks noGrp="1"/>
+          </p:cNvSpPr>
+          <p:nvPr>
+            <p:ph idx="1"/>
+          </p:nvPr>
+        </p:nvSpPr>
+        <p:spPr>
+          <a:xfrm>
+            <a:off x="838200" y="933450"/>
+            <a:ext cx="10515600" cy="5243513"/>
+          </a:xfrm>
+        </p:spPr>
+        <p:txBody>
+          <a:bodyPr>
+            <a:normAutofit/>
+          </a:bodyPr>
+          <a:lstStyle/>
+          <a:p>
+            <a:pPr marL="0" indent="0">
+              <a:buNone/>
+            </a:pPr>
+            <a:r>
+              <a:rPr lang="en-US" sz="2000" dirty="0"/>
+              <a:t>Following are the results on the test data from the first trained model</a:t>
+            </a:r>
+          </a:p>
+          <a:p>
+            <a:r>
+              <a:rPr lang="en-US" sz="1600" dirty="0" err="1"/>
+              <a:t>Mean_IoU</a:t>
+            </a:r>
+            <a:r>
+              <a:rPr lang="en-US" sz="1600" dirty="0"/>
+              <a:t> = 0.54 </a:t>
+            </a:r>
+          </a:p>
+          <a:p>
+            <a:r>
+              <a:rPr lang="en-US" sz="1600" dirty="0"/>
+              <a:t>Accuracy = 0.91 </a:t>
+            </a:r>
+          </a:p>
+          <a:p>
+            <a:r>
+              <a:rPr lang="en-US" sz="1600" dirty="0"/>
+              <a:t>Precision = 0.62 </a:t>
+            </a:r>
+          </a:p>
+          <a:p>
+            <a:r>
+              <a:rPr lang="en-US" sz="1600" dirty="0"/>
+              <a:t>Recall = 0.59</a:t>
+            </a:r>
+          </a:p>
+          <a:p>
+            <a:r>
+              <a:rPr lang="en-US" sz="2000" dirty="0"/>
+              <a:t>Precision and Recall are averaged at ‘macro’ level. </a:t>
+            </a:r>
+          </a:p>
+          <a:p>
+            <a:r>
+              <a:rPr lang="en-US" sz="2000" dirty="0"/>
+              <a:t>Weighted average has much higher value since the background (label 0) is huge majority.</a:t>
+            </a:r>
+          </a:p>
+          <a:p>
+            <a:pPr marL="0" indent="0">
+              <a:buNone/>
+            </a:pPr>
+            <a:r>
+              <a:rPr lang="en-US" sz="2000" dirty="0"/>
+              <a:t>Following are the results on test data from the finally trained model</a:t>
+            </a:r>
+          </a:p>
+          <a:p>
+            <a:r>
+              <a:rPr lang="en-US" sz="2000" dirty="0" err="1"/>
+              <a:t>Mean_IoU</a:t>
+            </a:r>
+            <a:r>
+              <a:rPr lang="en-US" sz="2000" dirty="0"/>
+              <a:t> =</a:t>
+            </a:r>
+          </a:p>
+          <a:p>
+            <a:r>
+              <a:rPr lang="en-US" sz="2000" dirty="0"/>
+              <a:t>Accuracy =</a:t>
+            </a:r>
+          </a:p>
+          <a:p>
+            <a:r>
+              <a:rPr lang="en-US" sz="2000" dirty="0"/>
+              <a:t>Precision =</a:t>
+            </a:r>
+          </a:p>
+          <a:p>
+            <a:r>
+              <a:rPr lang="en-US" sz="2000" dirty="0"/>
+              <a:t>Recall =</a:t>
+            </a:r>
+          </a:p>
+          <a:p>
+            <a:pPr marL="0" indent="0">
+              <a:buNone/>
+            </a:pPr>
+            <a:endParaRPr lang="en-US" sz="2000" dirty="0"/>
+          </a:p>
+          <a:p>
+            <a:endParaRPr lang="en-US" sz="2000" dirty="0"/>
           </a:p>
         </p:txBody>
       </p:sp>
     </p:spTree>
     <p:extLst>
       <p:ext uri="{BB962C8B-B14F-4D97-AF65-F5344CB8AC3E}">
-        <p14:creationId xmlns:p14="http://schemas.microsoft.com/office/powerpoint/2010/main" val="114371724"/>
+        <p14:creationId xmlns:p14="http://schemas.microsoft.com/office/powerpoint/2010/main" val="2929730918"/>
       </p:ext>
     </p:extLst>
   </p:cSld>

</xml_diff>